<commit_message>
maj diagramme de classe
</commit_message>
<xml_diff>
--- a/diagramme_de_classe.pptx
+++ b/diagramme_de_classe.pptx
@@ -259,7 +259,7 @@
           <a:p>
             <a:fld id="{09290FA0-1D6D-4AD1-8F64-BA6E9C8EE7F5}" type="datetimeFigureOut">
               <a:rPr lang="fr-FR" smtClean="0"/>
-              <a:t>25/04/2024</a:t>
+              <a:t>26/04/2024</a:t>
             </a:fld>
             <a:endParaRPr lang="fr-FR"/>
           </a:p>
@@ -457,7 +457,7 @@
           <a:p>
             <a:fld id="{09290FA0-1D6D-4AD1-8F64-BA6E9C8EE7F5}" type="datetimeFigureOut">
               <a:rPr lang="fr-FR" smtClean="0"/>
-              <a:t>25/04/2024</a:t>
+              <a:t>26/04/2024</a:t>
             </a:fld>
             <a:endParaRPr lang="fr-FR"/>
           </a:p>
@@ -665,7 +665,7 @@
           <a:p>
             <a:fld id="{09290FA0-1D6D-4AD1-8F64-BA6E9C8EE7F5}" type="datetimeFigureOut">
               <a:rPr lang="fr-FR" smtClean="0"/>
-              <a:t>25/04/2024</a:t>
+              <a:t>26/04/2024</a:t>
             </a:fld>
             <a:endParaRPr lang="fr-FR"/>
           </a:p>
@@ -863,7 +863,7 @@
           <a:p>
             <a:fld id="{09290FA0-1D6D-4AD1-8F64-BA6E9C8EE7F5}" type="datetimeFigureOut">
               <a:rPr lang="fr-FR" smtClean="0"/>
-              <a:t>25/04/2024</a:t>
+              <a:t>26/04/2024</a:t>
             </a:fld>
             <a:endParaRPr lang="fr-FR"/>
           </a:p>
@@ -1138,7 +1138,7 @@
           <a:p>
             <a:fld id="{09290FA0-1D6D-4AD1-8F64-BA6E9C8EE7F5}" type="datetimeFigureOut">
               <a:rPr lang="fr-FR" smtClean="0"/>
-              <a:t>25/04/2024</a:t>
+              <a:t>26/04/2024</a:t>
             </a:fld>
             <a:endParaRPr lang="fr-FR"/>
           </a:p>
@@ -1403,7 +1403,7 @@
           <a:p>
             <a:fld id="{09290FA0-1D6D-4AD1-8F64-BA6E9C8EE7F5}" type="datetimeFigureOut">
               <a:rPr lang="fr-FR" smtClean="0"/>
-              <a:t>25/04/2024</a:t>
+              <a:t>26/04/2024</a:t>
             </a:fld>
             <a:endParaRPr lang="fr-FR"/>
           </a:p>
@@ -1815,7 +1815,7 @@
           <a:p>
             <a:fld id="{09290FA0-1D6D-4AD1-8F64-BA6E9C8EE7F5}" type="datetimeFigureOut">
               <a:rPr lang="fr-FR" smtClean="0"/>
-              <a:t>25/04/2024</a:t>
+              <a:t>26/04/2024</a:t>
             </a:fld>
             <a:endParaRPr lang="fr-FR"/>
           </a:p>
@@ -1956,7 +1956,7 @@
           <a:p>
             <a:fld id="{09290FA0-1D6D-4AD1-8F64-BA6E9C8EE7F5}" type="datetimeFigureOut">
               <a:rPr lang="fr-FR" smtClean="0"/>
-              <a:t>25/04/2024</a:t>
+              <a:t>26/04/2024</a:t>
             </a:fld>
             <a:endParaRPr lang="fr-FR"/>
           </a:p>
@@ -2069,7 +2069,7 @@
           <a:p>
             <a:fld id="{09290FA0-1D6D-4AD1-8F64-BA6E9C8EE7F5}" type="datetimeFigureOut">
               <a:rPr lang="fr-FR" smtClean="0"/>
-              <a:t>25/04/2024</a:t>
+              <a:t>26/04/2024</a:t>
             </a:fld>
             <a:endParaRPr lang="fr-FR"/>
           </a:p>
@@ -2380,7 +2380,7 @@
           <a:p>
             <a:fld id="{09290FA0-1D6D-4AD1-8F64-BA6E9C8EE7F5}" type="datetimeFigureOut">
               <a:rPr lang="fr-FR" smtClean="0"/>
-              <a:t>25/04/2024</a:t>
+              <a:t>26/04/2024</a:t>
             </a:fld>
             <a:endParaRPr lang="fr-FR"/>
           </a:p>
@@ -2668,7 +2668,7 @@
           <a:p>
             <a:fld id="{09290FA0-1D6D-4AD1-8F64-BA6E9C8EE7F5}" type="datetimeFigureOut">
               <a:rPr lang="fr-FR" smtClean="0"/>
-              <a:t>25/04/2024</a:t>
+              <a:t>26/04/2024</a:t>
             </a:fld>
             <a:endParaRPr lang="fr-FR"/>
           </a:p>
@@ -2909,7 +2909,7 @@
           <a:p>
             <a:fld id="{09290FA0-1D6D-4AD1-8F64-BA6E9C8EE7F5}" type="datetimeFigureOut">
               <a:rPr lang="fr-FR" smtClean="0"/>
-              <a:t>25/04/2024</a:t>
+              <a:t>26/04/2024</a:t>
             </a:fld>
             <a:endParaRPr lang="fr-FR"/>
           </a:p>
@@ -3328,10 +3328,10 @@
       </p:grpSpPr>
       <p:sp>
         <p:nvSpPr>
-          <p:cNvPr id="4" name="Rectangle 3">
-            <a:extLst>
-              <a:ext uri="{FF2B5EF4-FFF2-40B4-BE49-F238E27FC236}">
-                <a16:creationId xmlns:a16="http://schemas.microsoft.com/office/drawing/2014/main" id="{5D0FBD39-B8A1-47A6-AF2C-295C096E3E0D}"/>
+          <p:cNvPr id="7" name="Rectangle 6">
+            <a:extLst>
+              <a:ext uri="{FF2B5EF4-FFF2-40B4-BE49-F238E27FC236}">
+                <a16:creationId xmlns:a16="http://schemas.microsoft.com/office/drawing/2014/main" id="{940E1965-B55C-4C75-96DA-C9C041B352D6}"/>
               </a:ext>
             </a:extLst>
           </p:cNvPr>
@@ -3340,8 +3340,8 @@
         </p:nvSpPr>
         <p:spPr>
           <a:xfrm>
-            <a:off x="5431766" y="863532"/>
-            <a:ext cx="1238488" cy="184667"/>
+            <a:off x="5432732" y="1043408"/>
+            <a:ext cx="1238504" cy="1738076"/>
           </a:xfrm>
           <a:prstGeom prst="rect">
             <a:avLst/>
@@ -3382,10 +3382,10 @@
       </p:sp>
       <p:sp>
         <p:nvSpPr>
-          <p:cNvPr id="5" name="ZoneTexte 4">
-            <a:extLst>
-              <a:ext uri="{FF2B5EF4-FFF2-40B4-BE49-F238E27FC236}">
-                <a16:creationId xmlns:a16="http://schemas.microsoft.com/office/drawing/2014/main" id="{FDB8A976-F5BF-4ED9-9B43-2B58FDDE9023}"/>
+          <p:cNvPr id="8" name="ZoneTexte 7">
+            <a:extLst>
+              <a:ext uri="{FF2B5EF4-FFF2-40B4-BE49-F238E27FC236}">
+                <a16:creationId xmlns:a16="http://schemas.microsoft.com/office/drawing/2014/main" id="{085ED348-7C75-44B0-882C-5EFAFACECFCE}"/>
               </a:ext>
             </a:extLst>
           </p:cNvPr>
@@ -3394,97 +3394,7 @@
         </p:nvSpPr>
         <p:spPr>
           <a:xfrm>
-            <a:off x="5439693" y="867282"/>
-            <a:ext cx="1238504" cy="184666"/>
-          </a:xfrm>
-          <a:prstGeom prst="rect">
-            <a:avLst/>
-          </a:prstGeom>
-          <a:noFill/>
-        </p:spPr>
-        <p:txBody>
-          <a:bodyPr wrap="square" rtlCol="0">
-            <a:spAutoFit/>
-          </a:bodyPr>
-          <a:lstStyle/>
-          <a:p>
-            <a:r>
-              <a:rPr lang="fr-FR" sz="600" dirty="0" err="1"/>
-              <a:t>Creature</a:t>
-            </a:r>
-            <a:endParaRPr lang="fr-FR" sz="600" dirty="0"/>
-          </a:p>
-        </p:txBody>
-      </p:sp>
-      <p:sp>
-        <p:nvSpPr>
-          <p:cNvPr id="7" name="Rectangle 6">
-            <a:extLst>
-              <a:ext uri="{FF2B5EF4-FFF2-40B4-BE49-F238E27FC236}">
-                <a16:creationId xmlns:a16="http://schemas.microsoft.com/office/drawing/2014/main" id="{940E1965-B55C-4C75-96DA-C9C041B352D6}"/>
-              </a:ext>
-            </a:extLst>
-          </p:cNvPr>
-          <p:cNvSpPr/>
-          <p:nvPr/>
-        </p:nvSpPr>
-        <p:spPr>
-          <a:xfrm>
-            <a:off x="5432732" y="1043408"/>
-            <a:ext cx="1238504" cy="1738076"/>
-          </a:xfrm>
-          <a:prstGeom prst="rect">
-            <a:avLst/>
-          </a:prstGeom>
-          <a:solidFill>
-            <a:schemeClr val="bg1"/>
-          </a:solidFill>
-          <a:ln>
-            <a:solidFill>
-              <a:schemeClr val="tx1"/>
-            </a:solidFill>
-          </a:ln>
-        </p:spPr>
-        <p:style>
-          <a:lnRef idx="2">
-            <a:schemeClr val="accent1">
-              <a:shade val="50000"/>
-            </a:schemeClr>
-          </a:lnRef>
-          <a:fillRef idx="1">
-            <a:schemeClr val="accent1"/>
-          </a:fillRef>
-          <a:effectRef idx="0">
-            <a:schemeClr val="accent1"/>
-          </a:effectRef>
-          <a:fontRef idx="minor">
-            <a:schemeClr val="lt1"/>
-          </a:fontRef>
-        </p:style>
-        <p:txBody>
-          <a:bodyPr rtlCol="0" anchor="ctr"/>
-          <a:lstStyle/>
-          <a:p>
-            <a:pPr algn="ctr"/>
-            <a:endParaRPr lang="fr-FR"/>
-          </a:p>
-        </p:txBody>
-      </p:sp>
-      <p:sp>
-        <p:nvSpPr>
-          <p:cNvPr id="8" name="ZoneTexte 7">
-            <a:extLst>
-              <a:ext uri="{FF2B5EF4-FFF2-40B4-BE49-F238E27FC236}">
-                <a16:creationId xmlns:a16="http://schemas.microsoft.com/office/drawing/2014/main" id="{085ED348-7C75-44B0-882C-5EFAFACECFCE}"/>
-              </a:ext>
-            </a:extLst>
-          </p:cNvPr>
-          <p:cNvSpPr txBox="1"/>
-          <p:nvPr/>
-        </p:nvSpPr>
-        <p:spPr>
-          <a:xfrm>
-            <a:off x="5436521" y="1021446"/>
+            <a:off x="5434574" y="1045861"/>
             <a:ext cx="1238504" cy="1754326"/>
           </a:xfrm>
           <a:prstGeom prst="rect">
@@ -7477,7 +7387,7 @@
         </p:nvSpPr>
         <p:spPr>
           <a:xfrm>
-            <a:off x="3792774" y="4837642"/>
+            <a:off x="3792774" y="4894500"/>
             <a:ext cx="1007519" cy="184667"/>
           </a:xfrm>
           <a:prstGeom prst="rect">
@@ -7531,7 +7441,7 @@
         </p:nvSpPr>
         <p:spPr>
           <a:xfrm>
-            <a:off x="3792761" y="4849004"/>
+            <a:off x="3792761" y="4905862"/>
             <a:ext cx="1007532" cy="184666"/>
           </a:xfrm>
           <a:prstGeom prst="rect">
@@ -7566,7 +7476,7 @@
         </p:nvSpPr>
         <p:spPr>
           <a:xfrm>
-            <a:off x="3792761" y="5022432"/>
+            <a:off x="3792761" y="5079290"/>
             <a:ext cx="1007532" cy="296291"/>
           </a:xfrm>
           <a:prstGeom prst="rect">
@@ -7620,7 +7530,7 @@
         </p:nvSpPr>
         <p:spPr>
           <a:xfrm>
-            <a:off x="3792761" y="5022309"/>
+            <a:off x="3792761" y="5079167"/>
             <a:ext cx="1007519" cy="276999"/>
           </a:xfrm>
           <a:prstGeom prst="rect">
@@ -7687,7 +7597,7 @@
         </p:nvSpPr>
         <p:spPr>
           <a:xfrm>
-            <a:off x="3792761" y="5316152"/>
+            <a:off x="3792761" y="5373010"/>
             <a:ext cx="1007532" cy="67957"/>
           </a:xfrm>
           <a:prstGeom prst="rect">
@@ -7744,9 +7654,9 @@
           <p:nvPr/>
         </p:nvCxnSpPr>
         <p:spPr>
-          <a:xfrm>
-            <a:off x="4800280" y="5160809"/>
-            <a:ext cx="569004" cy="1722"/>
+          <a:xfrm flipV="1">
+            <a:off x="4800280" y="5215915"/>
+            <a:ext cx="577785" cy="1752"/>
           </a:xfrm>
           <a:prstGeom prst="line">
             <a:avLst/>
@@ -7972,8 +7882,8 @@
         </p:nvSpPr>
         <p:spPr>
           <a:xfrm>
-            <a:off x="5378810" y="4747201"/>
-            <a:ext cx="1007532" cy="846751"/>
+            <a:off x="5378810" y="4747200"/>
+            <a:ext cx="1007532" cy="1005481"/>
           </a:xfrm>
           <a:prstGeom prst="rect">
             <a:avLst/>
@@ -8026,7 +7936,7 @@
         </p:nvSpPr>
         <p:spPr>
           <a:xfrm>
-            <a:off x="5378810" y="5567733"/>
+            <a:off x="5378810" y="5745306"/>
             <a:ext cx="1007532" cy="255377"/>
           </a:xfrm>
           <a:prstGeom prst="rect">
@@ -8080,8 +7990,8 @@
         </p:nvSpPr>
         <p:spPr>
           <a:xfrm>
-            <a:off x="5369284" y="4747032"/>
-            <a:ext cx="1007532" cy="830997"/>
+            <a:off x="5378065" y="4754250"/>
+            <a:ext cx="1007532" cy="923330"/>
           </a:xfrm>
           <a:prstGeom prst="rect">
             <a:avLst/>
@@ -8096,6 +8006,20 @@
           <a:p>
             <a:r>
               <a:rPr lang="fr-FR" sz="600" dirty="0"/>
+              <a:t>-position: </a:t>
+            </a:r>
+            <a:r>
+              <a:rPr lang="fr-FR" sz="600" dirty="0" err="1"/>
+              <a:t>int</a:t>
+            </a:r>
+            <a:r>
+              <a:rPr lang="fr-FR" sz="600" dirty="0"/>
+              <a:t>[]</a:t>
+            </a:r>
+          </a:p>
+          <a:p>
+            <a:r>
+              <a:rPr lang="fr-FR" sz="600" dirty="0"/>
               <a:t>-</a:t>
             </a:r>
             <a:r>
@@ -8252,7 +8176,7 @@
         </p:nvSpPr>
         <p:spPr>
           <a:xfrm>
-            <a:off x="5354456" y="5556921"/>
+            <a:off x="5376140" y="5747080"/>
             <a:ext cx="1007532" cy="276999"/>
           </a:xfrm>
           <a:prstGeom prst="rect">
@@ -8319,7 +8243,7 @@
         </p:nvSpPr>
         <p:spPr>
           <a:xfrm>
-            <a:off x="4938957" y="6266684"/>
+            <a:off x="4943719" y="6426720"/>
             <a:ext cx="526264" cy="184667"/>
           </a:xfrm>
           <a:prstGeom prst="rect">
@@ -8373,7 +8297,7 @@
         </p:nvSpPr>
         <p:spPr>
           <a:xfrm>
-            <a:off x="4938943" y="6278046"/>
+            <a:off x="4943705" y="6438082"/>
             <a:ext cx="526271" cy="184666"/>
           </a:xfrm>
           <a:prstGeom prst="rect">
@@ -8408,7 +8332,7 @@
         </p:nvSpPr>
         <p:spPr>
           <a:xfrm>
-            <a:off x="4938943" y="6451475"/>
+            <a:off x="4943705" y="6611511"/>
             <a:ext cx="526271" cy="58030"/>
           </a:xfrm>
           <a:prstGeom prst="rect">
@@ -8462,7 +8386,7 @@
         </p:nvSpPr>
         <p:spPr>
           <a:xfrm>
-            <a:off x="4938943" y="6511551"/>
+            <a:off x="4943705" y="6671587"/>
             <a:ext cx="526271" cy="58030"/>
           </a:xfrm>
           <a:prstGeom prst="rect">
@@ -8516,7 +8440,7 @@
         </p:nvSpPr>
         <p:spPr>
           <a:xfrm>
-            <a:off x="5594826" y="6266684"/>
+            <a:off x="5599588" y="6426720"/>
             <a:ext cx="526263" cy="184667"/>
           </a:xfrm>
           <a:prstGeom prst="rect">
@@ -8570,7 +8494,7 @@
         </p:nvSpPr>
         <p:spPr>
           <a:xfrm>
-            <a:off x="5594813" y="6278046"/>
+            <a:off x="5599575" y="6438082"/>
             <a:ext cx="526270" cy="184666"/>
           </a:xfrm>
           <a:prstGeom prst="rect">
@@ -8606,7 +8530,7 @@
         </p:nvSpPr>
         <p:spPr>
           <a:xfrm>
-            <a:off x="5594813" y="6451475"/>
+            <a:off x="5599575" y="6611511"/>
             <a:ext cx="526270" cy="58030"/>
           </a:xfrm>
           <a:prstGeom prst="rect">
@@ -8660,7 +8584,7 @@
         </p:nvSpPr>
         <p:spPr>
           <a:xfrm>
-            <a:off x="5594813" y="6511551"/>
+            <a:off x="5599575" y="6671587"/>
             <a:ext cx="526270" cy="58030"/>
           </a:xfrm>
           <a:prstGeom prst="rect">
@@ -8714,7 +8638,7 @@
         </p:nvSpPr>
         <p:spPr>
           <a:xfrm>
-            <a:off x="6255436" y="6266684"/>
+            <a:off x="6260198" y="6426720"/>
             <a:ext cx="526263" cy="184667"/>
           </a:xfrm>
           <a:prstGeom prst="rect">
@@ -8768,7 +8692,7 @@
         </p:nvSpPr>
         <p:spPr>
           <a:xfrm>
-            <a:off x="6250675" y="6273862"/>
+            <a:off x="6255437" y="6433898"/>
             <a:ext cx="526270" cy="184666"/>
           </a:xfrm>
           <a:prstGeom prst="rect">
@@ -8804,7 +8728,7 @@
         </p:nvSpPr>
         <p:spPr>
           <a:xfrm>
-            <a:off x="6255423" y="6451475"/>
+            <a:off x="6260185" y="6611511"/>
             <a:ext cx="526270" cy="58030"/>
           </a:xfrm>
           <a:prstGeom prst="rect">
@@ -8858,7 +8782,7 @@
         </p:nvSpPr>
         <p:spPr>
           <a:xfrm>
-            <a:off x="6255423" y="6511551"/>
+            <a:off x="6260185" y="6671587"/>
             <a:ext cx="526270" cy="58030"/>
           </a:xfrm>
           <a:prstGeom prst="rect">
@@ -8914,7 +8838,7 @@
         </p:nvCxnSpPr>
         <p:spPr>
           <a:xfrm>
-            <a:off x="5202078" y="6050964"/>
+            <a:off x="5206840" y="6211000"/>
             <a:ext cx="1341943" cy="2269"/>
           </a:xfrm>
           <a:prstGeom prst="line">
@@ -8957,7 +8881,7 @@
         </p:nvCxnSpPr>
         <p:spPr>
           <a:xfrm flipV="1">
-            <a:off x="5202079" y="6052846"/>
+            <a:off x="5206841" y="6212882"/>
             <a:ext cx="0" cy="215676"/>
           </a:xfrm>
           <a:prstGeom prst="line">
@@ -9000,7 +8924,7 @@
         </p:nvCxnSpPr>
         <p:spPr>
           <a:xfrm flipV="1">
-            <a:off x="5861144" y="6053424"/>
+            <a:off x="5865906" y="6213460"/>
             <a:ext cx="0" cy="215676"/>
           </a:xfrm>
           <a:prstGeom prst="line">
@@ -9043,7 +8967,7 @@
         </p:nvCxnSpPr>
         <p:spPr>
           <a:xfrm flipV="1">
-            <a:off x="6538607" y="6052846"/>
+            <a:off x="6543369" y="6212882"/>
             <a:ext cx="0" cy="215676"/>
           </a:xfrm>
           <a:prstGeom prst="line">
@@ -9086,7 +9010,7 @@
         </p:nvCxnSpPr>
         <p:spPr>
           <a:xfrm flipV="1">
-            <a:off x="5861144" y="5833242"/>
+            <a:off x="5868287" y="5993278"/>
             <a:ext cx="0" cy="217722"/>
           </a:xfrm>
           <a:prstGeom prst="straightConnector1">
@@ -9488,7 +9412,7 @@
         </p:nvSpPr>
         <p:spPr>
           <a:xfrm>
-            <a:off x="7119542" y="2210051"/>
+            <a:off x="7065100" y="1503431"/>
             <a:ext cx="3500395" cy="184667"/>
           </a:xfrm>
           <a:prstGeom prst="rect">
@@ -9542,7 +9466,7 @@
         </p:nvSpPr>
         <p:spPr>
           <a:xfrm>
-            <a:off x="7125892" y="2212716"/>
+            <a:off x="7071450" y="1506096"/>
             <a:ext cx="3500439" cy="184666"/>
           </a:xfrm>
           <a:prstGeom prst="rect">
@@ -9577,7 +9501,7 @@
         </p:nvSpPr>
         <p:spPr>
           <a:xfrm>
-            <a:off x="7118358" y="2391763"/>
+            <a:off x="7063916" y="1685143"/>
             <a:ext cx="3500439" cy="519505"/>
           </a:xfrm>
           <a:prstGeom prst="rect">
@@ -9631,7 +9555,7 @@
         </p:nvSpPr>
         <p:spPr>
           <a:xfrm>
-            <a:off x="7118119" y="2378664"/>
+            <a:off x="7063677" y="1672044"/>
             <a:ext cx="3500439" cy="553998"/>
           </a:xfrm>
           <a:prstGeom prst="rect">
@@ -9741,8 +9665,8 @@
         </p:nvSpPr>
         <p:spPr>
           <a:xfrm>
-            <a:off x="7118597" y="2908691"/>
-            <a:ext cx="3500439" cy="436437"/>
+            <a:off x="7064155" y="2202071"/>
+            <a:ext cx="3500439" cy="828684"/>
           </a:xfrm>
           <a:prstGeom prst="rect">
             <a:avLst/>
@@ -9797,8 +9721,8 @@
         </p:nvCxnSpPr>
         <p:spPr>
           <a:xfrm flipV="1">
-            <a:off x="8771527" y="3353501"/>
-            <a:ext cx="0" cy="1289880"/>
+            <a:off x="8800108" y="3173722"/>
+            <a:ext cx="19144" cy="1474424"/>
           </a:xfrm>
           <a:prstGeom prst="line">
             <a:avLst/>
@@ -9839,8 +9763,8 @@
         </p:nvSpPr>
         <p:spPr>
           <a:xfrm>
-            <a:off x="7118297" y="2894700"/>
-            <a:ext cx="3500439" cy="461665"/>
+            <a:off x="7059888" y="2198489"/>
+            <a:ext cx="3500439" cy="923330"/>
           </a:xfrm>
           <a:prstGeom prst="rect">
             <a:avLst/>
@@ -9916,6 +9840,76 @@
             </a:r>
             <a:r>
               <a:rPr lang="fr-FR" sz="600" dirty="0" err="1"/>
+              <a:t>addCreatureInEnclosure</a:t>
+            </a:r>
+            <a:r>
+              <a:rPr lang="fr-FR" sz="600" dirty="0"/>
+              <a:t>(enclosure: Enclosure, </a:t>
+            </a:r>
+            <a:r>
+              <a:rPr lang="fr-FR" sz="600" dirty="0" err="1"/>
+              <a:t>creature</a:t>
+            </a:r>
+            <a:r>
+              <a:rPr lang="fr-FR" sz="600" dirty="0"/>
+              <a:t> </a:t>
+            </a:r>
+            <a:r>
+              <a:rPr lang="fr-FR" sz="600" dirty="0" err="1"/>
+              <a:t>Creature</a:t>
+            </a:r>
+            <a:r>
+              <a:rPr lang="fr-FR" sz="600" dirty="0"/>
+              <a:t>): </a:t>
+            </a:r>
+            <a:r>
+              <a:rPr lang="fr-FR" sz="600" dirty="0" err="1"/>
+              <a:t>void</a:t>
+            </a:r>
+            <a:endParaRPr lang="fr-FR" sz="600" dirty="0"/>
+          </a:p>
+          <a:p>
+            <a:r>
+              <a:rPr lang="fr-FR" sz="600" dirty="0"/>
+              <a:t>+</a:t>
+            </a:r>
+            <a:r>
+              <a:rPr lang="fr-FR" sz="600" dirty="0" err="1"/>
+              <a:t>sellCreatureInEnclosure</a:t>
+            </a:r>
+            <a:r>
+              <a:rPr lang="fr-FR" sz="600" dirty="0"/>
+              <a:t>(enclosure: Enclosure, </a:t>
+            </a:r>
+            <a:r>
+              <a:rPr lang="fr-FR" sz="600" dirty="0" err="1"/>
+              <a:t>creature</a:t>
+            </a:r>
+            <a:r>
+              <a:rPr lang="fr-FR" sz="600" dirty="0"/>
+              <a:t> </a:t>
+            </a:r>
+            <a:r>
+              <a:rPr lang="fr-FR" sz="600" dirty="0" err="1"/>
+              <a:t>Creature</a:t>
+            </a:r>
+            <a:r>
+              <a:rPr lang="fr-FR" sz="600" dirty="0"/>
+              <a:t>): </a:t>
+            </a:r>
+            <a:r>
+              <a:rPr lang="fr-FR" sz="600" dirty="0" err="1"/>
+              <a:t>void</a:t>
+            </a:r>
+            <a:endParaRPr lang="fr-FR" sz="600" dirty="0"/>
+          </a:p>
+          <a:p>
+            <a:r>
+              <a:rPr lang="fr-FR" sz="600" dirty="0"/>
+              <a:t>+</a:t>
+            </a:r>
+            <a:r>
+              <a:rPr lang="fr-FR" sz="600" dirty="0" err="1"/>
               <a:t>moveAnimalFromEnclosure</a:t>
             </a:r>
             <a:r>
@@ -9954,6 +9948,48 @@
               <a:rPr lang="fr-FR" sz="600" dirty="0"/>
               <a:t>: Enclosure)</a:t>
             </a:r>
+            <a:br>
+              <a:rPr lang="fr-FR" sz="600" dirty="0"/>
+            </a:br>
+            <a:r>
+              <a:rPr lang="fr-FR" sz="600" dirty="0"/>
+              <a:t>+</a:t>
+            </a:r>
+            <a:r>
+              <a:rPr lang="fr-FR" sz="600" dirty="0" err="1"/>
+              <a:t>addEnclosure</a:t>
+            </a:r>
+            <a:r>
+              <a:rPr lang="fr-FR" sz="600" dirty="0"/>
+              <a:t>(enclosure: Enclosure): </a:t>
+            </a:r>
+            <a:r>
+              <a:rPr lang="fr-FR" sz="600" dirty="0" err="1"/>
+              <a:t>void</a:t>
+            </a:r>
+            <a:endParaRPr lang="fr-FR" sz="600" dirty="0"/>
+          </a:p>
+          <a:p>
+            <a:r>
+              <a:rPr lang="fr-FR" sz="600" dirty="0"/>
+              <a:t>+</a:t>
+            </a:r>
+            <a:r>
+              <a:rPr lang="fr-FR" sz="600" dirty="0" err="1"/>
+              <a:t>sellEnclosure</a:t>
+            </a:r>
+            <a:r>
+              <a:rPr lang="fr-FR" sz="600" dirty="0"/>
+              <a:t>(enclosure: Enclosure): </a:t>
+            </a:r>
+            <a:r>
+              <a:rPr lang="fr-FR" sz="600" dirty="0" err="1"/>
+              <a:t>void</a:t>
+            </a:r>
+            <a:endParaRPr lang="fr-FR" sz="600" dirty="0"/>
+          </a:p>
+          <a:p>
+            <a:endParaRPr lang="fr-FR" sz="600" dirty="0"/>
           </a:p>
         </p:txBody>
       </p:sp>
@@ -10214,7 +10250,7 @@
         </p:nvSpPr>
         <p:spPr>
           <a:xfrm>
-            <a:off x="224459" y="1426826"/>
+            <a:off x="217316" y="1426826"/>
             <a:ext cx="686487" cy="318695"/>
           </a:xfrm>
           <a:prstGeom prst="rect">
@@ -10268,7 +10304,7 @@
         </p:nvSpPr>
         <p:spPr>
           <a:xfrm>
-            <a:off x="232824" y="1451470"/>
+            <a:off x="225681" y="1451470"/>
             <a:ext cx="686496" cy="276999"/>
           </a:xfrm>
           <a:prstGeom prst="rect">
@@ -10310,7 +10346,7 @@
         </p:nvSpPr>
         <p:spPr>
           <a:xfrm>
-            <a:off x="224446" y="1745645"/>
+            <a:off x="217303" y="1745645"/>
             <a:ext cx="686496" cy="72916"/>
           </a:xfrm>
           <a:prstGeom prst="rect">
@@ -10364,7 +10400,7 @@
         </p:nvSpPr>
         <p:spPr>
           <a:xfrm>
-            <a:off x="224446" y="1818561"/>
+            <a:off x="217303" y="1818561"/>
             <a:ext cx="686496" cy="210446"/>
           </a:xfrm>
           <a:prstGeom prst="rect">
@@ -10418,7 +10454,7 @@
         </p:nvSpPr>
         <p:spPr>
           <a:xfrm>
-            <a:off x="223354" y="1815060"/>
+            <a:off x="216211" y="1815060"/>
             <a:ext cx="686496" cy="184666"/>
           </a:xfrm>
           <a:prstGeom prst="rect">
@@ -10962,7 +10998,7 @@
         </p:nvSpPr>
         <p:spPr>
           <a:xfrm>
-            <a:off x="5822951" y="4366671"/>
+            <a:off x="5825332" y="4378576"/>
             <a:ext cx="96613" cy="176845"/>
           </a:xfrm>
           <a:prstGeom prst="diamond">
@@ -10971,6 +11007,11 @@
           <a:solidFill>
             <a:schemeClr val="bg1"/>
           </a:solidFill>
+          <a:ln>
+            <a:solidFill>
+              <a:schemeClr val="tx1"/>
+            </a:solidFill>
+          </a:ln>
         </p:spPr>
         <p:style>
           <a:lnRef idx="2">
@@ -10993,7 +11034,11 @@
           <a:lstStyle/>
           <a:p>
             <a:pPr algn="ctr"/>
-            <a:endParaRPr lang="fr-FR"/>
+            <a:endParaRPr lang="fr-FR">
+              <a:solidFill>
+                <a:schemeClr val="tx1"/>
+              </a:solidFill>
+            </a:endParaRPr>
           </a:p>
         </p:txBody>
       </p:sp>
@@ -11011,7 +11056,7 @@
         </p:nvSpPr>
         <p:spPr>
           <a:xfrm rot="5400000">
-            <a:off x="8156921" y="4977836"/>
+            <a:off x="8147397" y="4970693"/>
             <a:ext cx="96613" cy="176845"/>
           </a:xfrm>
           <a:prstGeom prst="diamond">
@@ -11020,6 +11065,11 @@
           <a:solidFill>
             <a:schemeClr val="bg1"/>
           </a:solidFill>
+          <a:ln>
+            <a:solidFill>
+              <a:schemeClr val="tx1"/>
+            </a:solidFill>
+          </a:ln>
         </p:spPr>
         <p:style>
           <a:lnRef idx="2">
@@ -11060,7 +11110,7 @@
         </p:nvSpPr>
         <p:spPr>
           <a:xfrm rot="10800000">
-            <a:off x="8723220" y="3353500"/>
+            <a:off x="8770945" y="3044756"/>
             <a:ext cx="96613" cy="176845"/>
           </a:xfrm>
           <a:prstGeom prst="diamond">
@@ -11069,6 +11119,11 @@
           <a:solidFill>
             <a:schemeClr val="bg1"/>
           </a:solidFill>
+          <a:ln>
+            <a:solidFill>
+              <a:schemeClr val="tx1"/>
+            </a:solidFill>
+          </a:ln>
         </p:spPr>
         <p:style>
           <a:lnRef idx="2">
@@ -11109,7 +11164,7 @@
         </p:nvSpPr>
         <p:spPr>
           <a:xfrm rot="16200000">
-            <a:off x="5225122" y="5077933"/>
+            <a:off x="5232555" y="5125119"/>
             <a:ext cx="96613" cy="176845"/>
           </a:xfrm>
           <a:prstGeom prst="diamond">
@@ -11118,6 +11173,11 @@
           <a:solidFill>
             <a:schemeClr val="bg1"/>
           </a:solidFill>
+          <a:ln>
+            <a:solidFill>
+              <a:schemeClr val="tx1"/>
+            </a:solidFill>
+          </a:ln>
         </p:spPr>
         <p:style>
           <a:lnRef idx="2">
@@ -11141,6 +11201,96 @@
           <a:p>
             <a:pPr algn="ctr"/>
             <a:endParaRPr lang="fr-FR"/>
+          </a:p>
+        </p:txBody>
+      </p:sp>
+      <p:sp>
+        <p:nvSpPr>
+          <p:cNvPr id="153" name="Rectangle 152">
+            <a:extLst>
+              <a:ext uri="{FF2B5EF4-FFF2-40B4-BE49-F238E27FC236}">
+                <a16:creationId xmlns:a16="http://schemas.microsoft.com/office/drawing/2014/main" id="{BD2E9647-B47D-4D57-96A5-8380CE95C25E}"/>
+              </a:ext>
+            </a:extLst>
+          </p:cNvPr>
+          <p:cNvSpPr/>
+          <p:nvPr/>
+        </p:nvSpPr>
+        <p:spPr>
+          <a:xfrm>
+            <a:off x="5432732" y="856487"/>
+            <a:ext cx="1238504" cy="186667"/>
+          </a:xfrm>
+          <a:prstGeom prst="rect">
+            <a:avLst/>
+          </a:prstGeom>
+          <a:solidFill>
+            <a:schemeClr val="bg1"/>
+          </a:solidFill>
+          <a:ln>
+            <a:solidFill>
+              <a:schemeClr val="tx1"/>
+            </a:solidFill>
+          </a:ln>
+        </p:spPr>
+        <p:style>
+          <a:lnRef idx="2">
+            <a:schemeClr val="accent1">
+              <a:shade val="50000"/>
+            </a:schemeClr>
+          </a:lnRef>
+          <a:fillRef idx="1">
+            <a:schemeClr val="accent1"/>
+          </a:fillRef>
+          <a:effectRef idx="0">
+            <a:schemeClr val="accent1"/>
+          </a:effectRef>
+          <a:fontRef idx="minor">
+            <a:schemeClr val="lt1"/>
+          </a:fontRef>
+        </p:style>
+        <p:txBody>
+          <a:bodyPr rtlCol="0" anchor="ctr"/>
+          <a:lstStyle/>
+          <a:p>
+            <a:pPr algn="ctr"/>
+            <a:endParaRPr lang="fr-FR"/>
+          </a:p>
+        </p:txBody>
+      </p:sp>
+      <p:sp>
+        <p:nvSpPr>
+          <p:cNvPr id="155" name="ZoneTexte 154">
+            <a:extLst>
+              <a:ext uri="{FF2B5EF4-FFF2-40B4-BE49-F238E27FC236}">
+                <a16:creationId xmlns:a16="http://schemas.microsoft.com/office/drawing/2014/main" id="{A1031440-B320-4106-A643-C38B7F2B25AF}"/>
+              </a:ext>
+            </a:extLst>
+          </p:cNvPr>
+          <p:cNvSpPr txBox="1"/>
+          <p:nvPr/>
+        </p:nvSpPr>
+        <p:spPr>
+          <a:xfrm>
+            <a:off x="5433343" y="861333"/>
+            <a:ext cx="1238504" cy="184666"/>
+          </a:xfrm>
+          <a:prstGeom prst="rect">
+            <a:avLst/>
+          </a:prstGeom>
+          <a:noFill/>
+        </p:spPr>
+        <p:txBody>
+          <a:bodyPr wrap="square" rtlCol="0">
+            <a:spAutoFit/>
+          </a:bodyPr>
+          <a:lstStyle/>
+          <a:p>
+            <a:r>
+              <a:rPr lang="fr-FR" sz="600" dirty="0" err="1"/>
+              <a:t>Creature</a:t>
+            </a:r>
+            <a:endParaRPr lang="fr-FR" sz="600" dirty="0"/>
           </a:p>
         </p:txBody>
       </p:sp>

</xml_diff>

<commit_message>
patch class diagram constant
</commit_message>
<xml_diff>
--- a/diagramme_de_classe.pptx
+++ b/diagramme_de_classe.pptx
@@ -3622,15 +3622,7 @@
           <a:p>
             <a:r>
               <a:rPr lang="fr-FR" sz="600" dirty="0"/>
-              <a:t>-</a:t>
-            </a:r>
-            <a:r>
-              <a:rPr lang="fr-FR" sz="600" dirty="0" err="1"/>
-              <a:t>addPrice</a:t>
-            </a:r>
-            <a:r>
-              <a:rPr lang="fr-FR" sz="600" dirty="0"/>
-              <a:t>: </a:t>
+              <a:t>-ADD_PRICE: </a:t>
             </a:r>
             <a:r>
               <a:rPr lang="fr-FR" sz="600" dirty="0" err="1"/>
@@ -3641,15 +3633,7 @@
           <a:p>
             <a:r>
               <a:rPr lang="fr-FR" sz="600" dirty="0"/>
-              <a:t>-</a:t>
-            </a:r>
-            <a:r>
-              <a:rPr lang="fr-FR" sz="600" dirty="0" err="1"/>
-              <a:t>sellPrice</a:t>
-            </a:r>
-            <a:r>
-              <a:rPr lang="fr-FR" sz="600" dirty="0"/>
-              <a:t>: </a:t>
+              <a:t>-SELL_PRICE: </a:t>
             </a:r>
             <a:r>
               <a:rPr lang="fr-FR" sz="600" dirty="0" err="1"/>
@@ -3660,15 +3644,7 @@
           <a:p>
             <a:r>
               <a:rPr lang="fr-FR" sz="600" dirty="0"/>
-              <a:t>-</a:t>
-            </a:r>
-            <a:r>
-              <a:rPr lang="fr-FR" sz="600" dirty="0" err="1"/>
-              <a:t>maintenancePrice</a:t>
-            </a:r>
-            <a:r>
-              <a:rPr lang="fr-FR" sz="600" dirty="0"/>
-              <a:t>: </a:t>
+              <a:t>-MAINTENANCE_PRICE: </a:t>
             </a:r>
             <a:r>
               <a:rPr lang="fr-FR" sz="600" dirty="0" err="1"/>
@@ -3679,15 +3655,7 @@
           <a:p>
             <a:r>
               <a:rPr lang="fr-FR" sz="600" dirty="0"/>
-              <a:t>-</a:t>
-            </a:r>
-            <a:r>
-              <a:rPr lang="fr-FR" sz="600" dirty="0" err="1"/>
-              <a:t>moneyGain</a:t>
-            </a:r>
-            <a:r>
-              <a:rPr lang="fr-FR" sz="600" dirty="0"/>
-              <a:t>: </a:t>
+              <a:t>-MONEY_GAIN: </a:t>
             </a:r>
             <a:r>
               <a:rPr lang="fr-FR" sz="600" dirty="0" err="1"/>
@@ -7621,7 +7589,7 @@
         <p:spPr>
           <a:xfrm flipV="1">
             <a:off x="4800280" y="5215915"/>
-            <a:ext cx="577785" cy="1752"/>
+            <a:ext cx="577784" cy="1752"/>
           </a:xfrm>
           <a:prstGeom prst="line">
             <a:avLst/>
@@ -7813,7 +7781,7 @@
         <p:spPr>
           <a:xfrm>
             <a:off x="5378810" y="4573772"/>
-            <a:ext cx="1007532" cy="184666"/>
+            <a:ext cx="798153" cy="184666"/>
           </a:xfrm>
           <a:prstGeom prst="rect">
             <a:avLst/>
@@ -7848,7 +7816,7 @@
         <p:spPr>
           <a:xfrm>
             <a:off x="5378810" y="4747200"/>
-            <a:ext cx="1007532" cy="1005481"/>
+            <a:ext cx="1004862" cy="1005481"/>
           </a:xfrm>
           <a:prstGeom prst="rect">
             <a:avLst/>
@@ -7955,8 +7923,8 @@
         </p:nvSpPr>
         <p:spPr>
           <a:xfrm>
-            <a:off x="5378065" y="4754250"/>
-            <a:ext cx="1007532" cy="923330"/>
+            <a:off x="5378064" y="4754250"/>
+            <a:ext cx="1035429" cy="923330"/>
           </a:xfrm>
           <a:prstGeom prst="rect">
             <a:avLst/>
@@ -8011,15 +7979,7 @@
           <a:p>
             <a:r>
               <a:rPr lang="fr-FR" sz="600" dirty="0"/>
-              <a:t>-</a:t>
-            </a:r>
-            <a:r>
-              <a:rPr lang="fr-FR" sz="600" dirty="0" err="1"/>
-              <a:t>maxAnimal</a:t>
-            </a:r>
-            <a:r>
-              <a:rPr lang="fr-FR" sz="600" dirty="0"/>
-              <a:t>: </a:t>
+              <a:t>-MAX_ANIMAL: </a:t>
             </a:r>
             <a:r>
               <a:rPr lang="fr-FR" sz="600" dirty="0" err="1"/>
@@ -8071,15 +8031,7 @@
           <a:p>
             <a:r>
               <a:rPr lang="fr-FR" sz="600" dirty="0"/>
-              <a:t>-</a:t>
-            </a:r>
-            <a:r>
-              <a:rPr lang="fr-FR" sz="600" dirty="0" err="1"/>
-              <a:t>addPrice</a:t>
-            </a:r>
-            <a:r>
-              <a:rPr lang="fr-FR" sz="600" dirty="0"/>
-              <a:t>: </a:t>
+              <a:t>-ADD_PRICE: </a:t>
             </a:r>
             <a:r>
               <a:rPr lang="fr-FR" sz="600" dirty="0" err="1"/>
@@ -8090,15 +8042,7 @@
           <a:p>
             <a:r>
               <a:rPr lang="fr-FR" sz="600" dirty="0"/>
-              <a:t>-</a:t>
-            </a:r>
-            <a:r>
-              <a:rPr lang="fr-FR" sz="600" dirty="0" err="1"/>
-              <a:t>sellPrice</a:t>
-            </a:r>
-            <a:r>
-              <a:rPr lang="fr-FR" sz="600" dirty="0"/>
-              <a:t>: </a:t>
+              <a:t>-SELL_PRICE: </a:t>
             </a:r>
             <a:r>
               <a:rPr lang="fr-FR" sz="600" dirty="0" err="1"/>
@@ -8109,15 +8053,7 @@
           <a:p>
             <a:r>
               <a:rPr lang="fr-FR" sz="600" dirty="0"/>
-              <a:t>-</a:t>
-            </a:r>
-            <a:r>
-              <a:rPr lang="fr-FR" sz="600" dirty="0" err="1"/>
-              <a:t>maintenancePrice</a:t>
-            </a:r>
-            <a:r>
-              <a:rPr lang="fr-FR" sz="600" dirty="0"/>
-              <a:t>: </a:t>
+              <a:t>-MAINTENANCE_PRICE: </a:t>
             </a:r>
             <a:r>
               <a:rPr lang="fr-FR" sz="600" dirty="0" err="1"/>

</xml_diff>

<commit_message>
enclosure, zoo and master class
</commit_message>
<xml_diff>
--- a/diagramme_de_classe.pptx
+++ b/diagramme_de_classe.pptx
@@ -8186,41 +8186,6 @@
       </p:sp>
       <p:sp>
         <p:nvSpPr>
-          <p:cNvPr id="331" name="ZoneTexte 330">
-            <a:extLst>
-              <a:ext uri="{FF2B5EF4-FFF2-40B4-BE49-F238E27FC236}">
-                <a16:creationId xmlns:a16="http://schemas.microsoft.com/office/drawing/2014/main" id="{4016A8A8-A9BF-419B-A361-0D1DC7BAE1BC}"/>
-              </a:ext>
-            </a:extLst>
-          </p:cNvPr>
-          <p:cNvSpPr txBox="1"/>
-          <p:nvPr/>
-        </p:nvSpPr>
-        <p:spPr>
-          <a:xfrm>
-            <a:off x="4755572" y="6155090"/>
-            <a:ext cx="660976" cy="184666"/>
-          </a:xfrm>
-          <a:prstGeom prst="rect">
-            <a:avLst/>
-          </a:prstGeom>
-          <a:noFill/>
-        </p:spPr>
-        <p:txBody>
-          <a:bodyPr wrap="square" rtlCol="0">
-            <a:spAutoFit/>
-          </a:bodyPr>
-          <a:lstStyle/>
-          <a:p>
-            <a:r>
-              <a:rPr lang="fr-FR" sz="600" dirty="0"/>
-              <a:t>Aquarium</a:t>
-            </a:r>
-          </a:p>
-        </p:txBody>
-      </p:sp>
-      <p:sp>
-        <p:nvSpPr>
           <p:cNvPr id="332" name="Rectangle 331">
             <a:extLst>
               <a:ext uri="{FF2B5EF4-FFF2-40B4-BE49-F238E27FC236}">
@@ -8395,8 +8360,8 @@
         </p:nvSpPr>
         <p:spPr>
           <a:xfrm>
-            <a:off x="5599575" y="6161852"/>
-            <a:ext cx="526270" cy="184666"/>
+            <a:off x="4759844" y="6154432"/>
+            <a:ext cx="705369" cy="184666"/>
           </a:xfrm>
           <a:prstGeom prst="rect">
             <a:avLst/>
@@ -9368,7 +9333,7 @@
         <p:spPr>
           <a:xfrm>
             <a:off x="7069031" y="1685019"/>
-            <a:ext cx="3500439" cy="553998"/>
+            <a:ext cx="3500439" cy="461665"/>
           </a:xfrm>
           <a:prstGeom prst="rect">
             <a:avLst/>
@@ -9434,20 +9399,6 @@
             <a:r>
               <a:rPr lang="fr-FR" sz="600" dirty="0"/>
               <a:t>(‘M’, ‘F’)</a:t>
-            </a:r>
-          </a:p>
-          <a:p>
-            <a:r>
-              <a:rPr lang="fr-FR" sz="600" dirty="0"/>
-              <a:t>-</a:t>
-            </a:r>
-            <a:r>
-              <a:rPr lang="fr-FR" sz="600" dirty="0" err="1"/>
-              <a:t>enclosureList</a:t>
-            </a:r>
-            <a:r>
-              <a:rPr lang="fr-FR" sz="600" dirty="0"/>
-              <a:t>: Enclosure[]</a:t>
             </a:r>
           </a:p>
           <a:p>
@@ -11403,6 +11354,41 @@
               <a:t>int</a:t>
             </a:r>
             <a:endParaRPr lang="fr-FR" sz="600" dirty="0"/>
+          </a:p>
+        </p:txBody>
+      </p:sp>
+      <p:sp>
+        <p:nvSpPr>
+          <p:cNvPr id="165" name="ZoneTexte 164">
+            <a:extLst>
+              <a:ext uri="{FF2B5EF4-FFF2-40B4-BE49-F238E27FC236}">
+                <a16:creationId xmlns:a16="http://schemas.microsoft.com/office/drawing/2014/main" id="{092852DD-0B50-4336-9EB4-CD9340CA5284}"/>
+              </a:ext>
+            </a:extLst>
+          </p:cNvPr>
+          <p:cNvSpPr txBox="1"/>
+          <p:nvPr/>
+        </p:nvSpPr>
+        <p:spPr>
+          <a:xfrm>
+            <a:off x="5599563" y="6150490"/>
+            <a:ext cx="526263" cy="184666"/>
+          </a:xfrm>
+          <a:prstGeom prst="rect">
+            <a:avLst/>
+          </a:prstGeom>
+          <a:noFill/>
+        </p:spPr>
+        <p:txBody>
+          <a:bodyPr wrap="square" rtlCol="0">
+            <a:spAutoFit/>
+          </a:bodyPr>
+          <a:lstStyle/>
+          <a:p>
+            <a:r>
+              <a:rPr lang="fr-FR" sz="600" dirty="0"/>
+              <a:t>Aquarium</a:t>
+            </a:r>
           </a:p>
         </p:txBody>
       </p:sp>

</xml_diff>

<commit_message>
maj diagramme de classe & readMe
</commit_message>
<xml_diff>
--- a/diagramme_de_classe.pptx
+++ b/diagramme_de_classe.pptx
@@ -259,7 +259,7 @@
           <a:p>
             <a:fld id="{09290FA0-1D6D-4AD1-8F64-BA6E9C8EE7F5}" type="datetimeFigureOut">
               <a:rPr lang="fr-FR" smtClean="0"/>
-              <a:t>29/04/2024</a:t>
+              <a:t>02/06/2024</a:t>
             </a:fld>
             <a:endParaRPr lang="fr-FR"/>
           </a:p>
@@ -457,7 +457,7 @@
           <a:p>
             <a:fld id="{09290FA0-1D6D-4AD1-8F64-BA6E9C8EE7F5}" type="datetimeFigureOut">
               <a:rPr lang="fr-FR" smtClean="0"/>
-              <a:t>29/04/2024</a:t>
+              <a:t>02/06/2024</a:t>
             </a:fld>
             <a:endParaRPr lang="fr-FR"/>
           </a:p>
@@ -665,7 +665,7 @@
           <a:p>
             <a:fld id="{09290FA0-1D6D-4AD1-8F64-BA6E9C8EE7F5}" type="datetimeFigureOut">
               <a:rPr lang="fr-FR" smtClean="0"/>
-              <a:t>29/04/2024</a:t>
+              <a:t>02/06/2024</a:t>
             </a:fld>
             <a:endParaRPr lang="fr-FR"/>
           </a:p>
@@ -863,7 +863,7 @@
           <a:p>
             <a:fld id="{09290FA0-1D6D-4AD1-8F64-BA6E9C8EE7F5}" type="datetimeFigureOut">
               <a:rPr lang="fr-FR" smtClean="0"/>
-              <a:t>29/04/2024</a:t>
+              <a:t>02/06/2024</a:t>
             </a:fld>
             <a:endParaRPr lang="fr-FR"/>
           </a:p>
@@ -1138,7 +1138,7 @@
           <a:p>
             <a:fld id="{09290FA0-1D6D-4AD1-8F64-BA6E9C8EE7F5}" type="datetimeFigureOut">
               <a:rPr lang="fr-FR" smtClean="0"/>
-              <a:t>29/04/2024</a:t>
+              <a:t>02/06/2024</a:t>
             </a:fld>
             <a:endParaRPr lang="fr-FR"/>
           </a:p>
@@ -1403,7 +1403,7 @@
           <a:p>
             <a:fld id="{09290FA0-1D6D-4AD1-8F64-BA6E9C8EE7F5}" type="datetimeFigureOut">
               <a:rPr lang="fr-FR" smtClean="0"/>
-              <a:t>29/04/2024</a:t>
+              <a:t>02/06/2024</a:t>
             </a:fld>
             <a:endParaRPr lang="fr-FR"/>
           </a:p>
@@ -1815,7 +1815,7 @@
           <a:p>
             <a:fld id="{09290FA0-1D6D-4AD1-8F64-BA6E9C8EE7F5}" type="datetimeFigureOut">
               <a:rPr lang="fr-FR" smtClean="0"/>
-              <a:t>29/04/2024</a:t>
+              <a:t>02/06/2024</a:t>
             </a:fld>
             <a:endParaRPr lang="fr-FR"/>
           </a:p>
@@ -1956,7 +1956,7 @@
           <a:p>
             <a:fld id="{09290FA0-1D6D-4AD1-8F64-BA6E9C8EE7F5}" type="datetimeFigureOut">
               <a:rPr lang="fr-FR" smtClean="0"/>
-              <a:t>29/04/2024</a:t>
+              <a:t>02/06/2024</a:t>
             </a:fld>
             <a:endParaRPr lang="fr-FR"/>
           </a:p>
@@ -2069,7 +2069,7 @@
           <a:p>
             <a:fld id="{09290FA0-1D6D-4AD1-8F64-BA6E9C8EE7F5}" type="datetimeFigureOut">
               <a:rPr lang="fr-FR" smtClean="0"/>
-              <a:t>29/04/2024</a:t>
+              <a:t>02/06/2024</a:t>
             </a:fld>
             <a:endParaRPr lang="fr-FR"/>
           </a:p>
@@ -2380,7 +2380,7 @@
           <a:p>
             <a:fld id="{09290FA0-1D6D-4AD1-8F64-BA6E9C8EE7F5}" type="datetimeFigureOut">
               <a:rPr lang="fr-FR" smtClean="0"/>
-              <a:t>29/04/2024</a:t>
+              <a:t>02/06/2024</a:t>
             </a:fld>
             <a:endParaRPr lang="fr-FR"/>
           </a:p>
@@ -2668,7 +2668,7 @@
           <a:p>
             <a:fld id="{09290FA0-1D6D-4AD1-8F64-BA6E9C8EE7F5}" type="datetimeFigureOut">
               <a:rPr lang="fr-FR" smtClean="0"/>
-              <a:t>29/04/2024</a:t>
+              <a:t>02/06/2024</a:t>
             </a:fld>
             <a:endParaRPr lang="fr-FR"/>
           </a:p>
@@ -2909,7 +2909,7 @@
           <a:p>
             <a:fld id="{09290FA0-1D6D-4AD1-8F64-BA6E9C8EE7F5}" type="datetimeFigureOut">
               <a:rPr lang="fr-FR" smtClean="0"/>
-              <a:t>29/04/2024</a:t>
+              <a:t>02/06/2024</a:t>
             </a:fld>
             <a:endParaRPr lang="fr-FR"/>
           </a:p>
@@ -3395,7 +3395,7 @@
         <p:spPr>
           <a:xfrm>
             <a:off x="5434574" y="1045861"/>
-            <a:ext cx="1238504" cy="1754326"/>
+            <a:ext cx="1238504" cy="1015663"/>
           </a:xfrm>
           <a:prstGeom prst="rect">
             <a:avLst/>
@@ -3465,11 +3465,20 @@
               <a:rPr lang="fr-FR" sz="600" dirty="0"/>
               <a:t>-size: double</a:t>
             </a:r>
-          </a:p>
-          <a:p>
-            <a:r>
-              <a:rPr lang="fr-FR" sz="600" dirty="0"/>
-              <a:t>-MAX_AGE: </a:t>
+            <a:br>
+              <a:rPr lang="fr-FR" sz="600" dirty="0"/>
+            </a:br>
+            <a:r>
+              <a:rPr lang="fr-FR" sz="600" dirty="0"/>
+              <a:t>-</a:t>
+            </a:r>
+            <a:r>
+              <a:rPr lang="fr-FR" sz="600" dirty="0" err="1"/>
+              <a:t>age</a:t>
+            </a:r>
+            <a:r>
+              <a:rPr lang="fr-FR" sz="600" dirty="0"/>
+              <a:t>: </a:t>
             </a:r>
             <a:r>
               <a:rPr lang="fr-FR" sz="600" dirty="0" err="1"/>
@@ -3484,7 +3493,7 @@
             </a:r>
             <a:r>
               <a:rPr lang="fr-FR" sz="600" dirty="0" err="1"/>
-              <a:t>age</a:t>
+              <a:t>hunger</a:t>
             </a:r>
             <a:r>
               <a:rPr lang="fr-FR" sz="600" dirty="0"/>
@@ -3494,85 +3503,44 @@
               <a:rPr lang="fr-FR" sz="600" dirty="0" err="1"/>
               <a:t>int</a:t>
             </a:r>
+            <a:br>
+              <a:rPr lang="fr-FR" sz="600" dirty="0"/>
+            </a:br>
+            <a:r>
+              <a:rPr lang="fr-FR" sz="600" dirty="0"/>
+              <a:t>-</a:t>
+            </a:r>
+            <a:r>
+              <a:rPr lang="fr-FR" sz="600" dirty="0" err="1"/>
+              <a:t>sleep</a:t>
+            </a:r>
+            <a:r>
+              <a:rPr lang="fr-FR" sz="600" dirty="0"/>
+              <a:t>: </a:t>
+            </a:r>
+            <a:r>
+              <a:rPr lang="fr-FR" sz="600" dirty="0" err="1"/>
+              <a:t>boolean</a:t>
+            </a:r>
             <a:endParaRPr lang="fr-FR" sz="600" dirty="0"/>
           </a:p>
           <a:p>
             <a:r>
               <a:rPr lang="fr-FR" sz="600" dirty="0"/>
-              <a:t>-MAX_HUNGER: </a:t>
+              <a:t>-</a:t>
+            </a:r>
+            <a:r>
+              <a:rPr lang="fr-FR" sz="600" dirty="0" err="1"/>
+              <a:t>stamina</a:t>
+            </a:r>
+            <a:r>
+              <a:rPr lang="fr-FR" sz="600" dirty="0"/>
+              <a:t>: </a:t>
             </a:r>
             <a:r>
               <a:rPr lang="fr-FR" sz="600" dirty="0" err="1"/>
               <a:t>int</a:t>
             </a:r>
-            <a:br>
-              <a:rPr lang="fr-FR" sz="600" dirty="0"/>
-            </a:br>
-            <a:r>
-              <a:rPr lang="fr-FR" sz="600" dirty="0"/>
-              <a:t>-</a:t>
-            </a:r>
-            <a:r>
-              <a:rPr lang="fr-FR" sz="600" dirty="0" err="1"/>
-              <a:t>hunger</a:t>
-            </a:r>
-            <a:r>
-              <a:rPr lang="fr-FR" sz="600" dirty="0"/>
-              <a:t>: </a:t>
-            </a:r>
-            <a:r>
-              <a:rPr lang="fr-FR" sz="600" dirty="0" err="1"/>
-              <a:t>int</a:t>
-            </a:r>
-            <a:br>
-              <a:rPr lang="fr-FR" sz="600" dirty="0"/>
-            </a:br>
-            <a:r>
-              <a:rPr lang="fr-FR" sz="600" dirty="0"/>
-              <a:t>-</a:t>
-            </a:r>
-            <a:r>
-              <a:rPr lang="fr-FR" sz="600" dirty="0" err="1"/>
-              <a:t>sleep</a:t>
-            </a:r>
-            <a:r>
-              <a:rPr lang="fr-FR" sz="600" dirty="0"/>
-              <a:t>: </a:t>
-            </a:r>
-            <a:r>
-              <a:rPr lang="fr-FR" sz="600" dirty="0" err="1"/>
-              <a:t>boolean</a:t>
-            </a:r>
-            <a:endParaRPr lang="fr-FR" sz="600" dirty="0"/>
-          </a:p>
-          <a:p>
-            <a:r>
-              <a:rPr lang="fr-FR" sz="600" dirty="0"/>
-              <a:t>-MAX_STAMINA: </a:t>
-            </a:r>
-            <a:r>
-              <a:rPr lang="fr-FR" sz="600" dirty="0" err="1"/>
-              <a:t>int</a:t>
-            </a:r>
-            <a:endParaRPr lang="fr-FR" sz="600" dirty="0"/>
-          </a:p>
-          <a:p>
-            <a:r>
-              <a:rPr lang="fr-FR" sz="600" dirty="0"/>
-              <a:t>-</a:t>
-            </a:r>
-            <a:r>
-              <a:rPr lang="fr-FR" sz="600" dirty="0" err="1"/>
-              <a:t>stamina</a:t>
-            </a:r>
-            <a:r>
-              <a:rPr lang="fr-FR" sz="600" dirty="0"/>
-              <a:t>: </a:t>
-            </a:r>
-            <a:r>
-              <a:rPr lang="fr-FR" sz="600" dirty="0" err="1"/>
-              <a:t>int</a:t>
-            </a:r>
             <a:endParaRPr lang="fr-FR" sz="600" dirty="0"/>
           </a:p>
           <a:p>
@@ -3588,16 +3556,6 @@
               <a:rPr lang="fr-FR" sz="600" dirty="0"/>
               <a:t>(0, 1, 2)</a:t>
             </a:r>
-          </a:p>
-          <a:p>
-            <a:r>
-              <a:rPr lang="fr-FR" sz="600" dirty="0"/>
-              <a:t>-MAX_HP: </a:t>
-            </a:r>
-            <a:r>
-              <a:rPr lang="fr-FR" sz="600" dirty="0" err="1"/>
-              <a:t>int</a:t>
-            </a:r>
             <a:br>
               <a:rPr lang="fr-FR" sz="600" dirty="0"/>
             </a:br>
@@ -3612,50 +3570,6 @@
             <a:r>
               <a:rPr lang="fr-FR" sz="600" dirty="0"/>
               <a:t>: </a:t>
-            </a:r>
-            <a:r>
-              <a:rPr lang="fr-FR" sz="600" dirty="0" err="1"/>
-              <a:t>int</a:t>
-            </a:r>
-            <a:endParaRPr lang="fr-FR" sz="600" dirty="0"/>
-          </a:p>
-          <a:p>
-            <a:r>
-              <a:rPr lang="fr-FR" sz="600" dirty="0"/>
-              <a:t>-ADD_PRICE: </a:t>
-            </a:r>
-            <a:r>
-              <a:rPr lang="fr-FR" sz="600" dirty="0" err="1"/>
-              <a:t>int</a:t>
-            </a:r>
-            <a:endParaRPr lang="fr-FR" sz="600" dirty="0"/>
-          </a:p>
-          <a:p>
-            <a:r>
-              <a:rPr lang="fr-FR" sz="600" dirty="0"/>
-              <a:t>-SELL_PRICE: </a:t>
-            </a:r>
-            <a:r>
-              <a:rPr lang="fr-FR" sz="600" dirty="0" err="1"/>
-              <a:t>int</a:t>
-            </a:r>
-            <a:endParaRPr lang="fr-FR" sz="600" dirty="0"/>
-          </a:p>
-          <a:p>
-            <a:r>
-              <a:rPr lang="fr-FR" sz="600" dirty="0"/>
-              <a:t>-MAINTENANCE_PRICE: </a:t>
-            </a:r>
-            <a:r>
-              <a:rPr lang="fr-FR" sz="600" dirty="0" err="1"/>
-              <a:t>int</a:t>
-            </a:r>
-            <a:endParaRPr lang="fr-FR" sz="600" dirty="0"/>
-          </a:p>
-          <a:p>
-            <a:r>
-              <a:rPr lang="fr-FR" sz="600" dirty="0"/>
-              <a:t>-MONEY_GAIN: </a:t>
             </a:r>
             <a:r>
               <a:rPr lang="fr-FR" sz="600" dirty="0" err="1"/>
@@ -7582,14 +7496,13 @@
           <p:cNvCxnSpPr>
             <a:cxnSpLocks/>
             <a:stCxn id="309" idx="3"/>
-            <a:endCxn id="328" idx="1"/>
           </p:cNvCxnSpPr>
           <p:nvPr/>
         </p:nvCxnSpPr>
         <p:spPr>
-          <a:xfrm flipV="1">
-            <a:off x="4800280" y="4939685"/>
-            <a:ext cx="577784" cy="1752"/>
+          <a:xfrm>
+            <a:off x="4800280" y="4941437"/>
+            <a:ext cx="577784" cy="0"/>
           </a:xfrm>
           <a:prstGeom prst="line">
             <a:avLst/>
@@ -7924,7 +7837,7 @@
         <p:spPr>
           <a:xfrm>
             <a:off x="5378064" y="4478020"/>
-            <a:ext cx="1035429" cy="923330"/>
+            <a:ext cx="1035429" cy="553998"/>
           </a:xfrm>
           <a:prstGeom prst="rect">
             <a:avLst/>
@@ -7979,17 +7892,6 @@
           <a:p>
             <a:r>
               <a:rPr lang="fr-FR" sz="600" dirty="0"/>
-              <a:t>-MAX_ANIMAL: </a:t>
-            </a:r>
-            <a:r>
-              <a:rPr lang="fr-FR" sz="600" dirty="0" err="1"/>
-              <a:t>int</a:t>
-            </a:r>
-            <a:endParaRPr lang="fr-FR" sz="600" dirty="0"/>
-          </a:p>
-          <a:p>
-            <a:r>
-              <a:rPr lang="fr-FR" sz="600" dirty="0"/>
               <a:t>-</a:t>
             </a:r>
             <a:r>
@@ -8021,39 +7923,6 @@
             <a:r>
               <a:rPr lang="fr-FR" sz="600" dirty="0"/>
               <a:t>: </a:t>
-            </a:r>
-            <a:r>
-              <a:rPr lang="fr-FR" sz="600" dirty="0" err="1"/>
-              <a:t>int</a:t>
-            </a:r>
-            <a:endParaRPr lang="fr-FR" sz="600" dirty="0"/>
-          </a:p>
-          <a:p>
-            <a:r>
-              <a:rPr lang="fr-FR" sz="600" dirty="0"/>
-              <a:t>-ADD_PRICE: </a:t>
-            </a:r>
-            <a:r>
-              <a:rPr lang="fr-FR" sz="600" dirty="0" err="1"/>
-              <a:t>int</a:t>
-            </a:r>
-            <a:endParaRPr lang="fr-FR" sz="600" dirty="0"/>
-          </a:p>
-          <a:p>
-            <a:r>
-              <a:rPr lang="fr-FR" sz="600" dirty="0"/>
-              <a:t>-SELL_PRICE: </a:t>
-            </a:r>
-            <a:r>
-              <a:rPr lang="fr-FR" sz="600" dirty="0" err="1"/>
-              <a:t>int</a:t>
-            </a:r>
-            <a:endParaRPr lang="fr-FR" sz="600" dirty="0"/>
-          </a:p>
-          <a:p>
-            <a:r>
-              <a:rPr lang="fr-FR" sz="600" dirty="0"/>
-              <a:t>-MAINTENANCE_PRICE: </a:t>
             </a:r>
             <a:r>
               <a:rPr lang="fr-FR" sz="600" dirty="0" err="1"/>
@@ -8724,7 +8593,7 @@
         <p:spPr>
           <a:xfrm>
             <a:off x="5206840" y="6046691"/>
-            <a:ext cx="1341943" cy="2269"/>
+            <a:ext cx="2047729" cy="44"/>
           </a:xfrm>
           <a:prstGeom prst="line">
             <a:avLst/>
@@ -11408,6 +11277,247 @@
               <a:rPr lang="fr-FR" sz="600" dirty="0"/>
               <a:t>Aquarium</a:t>
             </a:r>
+          </a:p>
+        </p:txBody>
+      </p:sp>
+      <p:cxnSp>
+        <p:nvCxnSpPr>
+          <p:cNvPr id="166" name="Connecteur droit 165">
+            <a:extLst>
+              <a:ext uri="{FF2B5EF4-FFF2-40B4-BE49-F238E27FC236}">
+                <a16:creationId xmlns:a16="http://schemas.microsoft.com/office/drawing/2014/main" id="{3B40CC87-40E8-4BC1-9B42-3FD7AA6E7FC7}"/>
+              </a:ext>
+            </a:extLst>
+          </p:cNvPr>
+          <p:cNvCxnSpPr>
+            <a:cxnSpLocks/>
+          </p:cNvCxnSpPr>
+          <p:nvPr/>
+        </p:nvCxnSpPr>
+        <p:spPr>
+          <a:xfrm flipV="1">
+            <a:off x="7254569" y="6046735"/>
+            <a:ext cx="0" cy="215676"/>
+          </a:xfrm>
+          <a:prstGeom prst="line">
+            <a:avLst/>
+          </a:prstGeom>
+          <a:ln w="12700">
+            <a:solidFill>
+              <a:schemeClr val="tx1"/>
+            </a:solidFill>
+          </a:ln>
+        </p:spPr>
+        <p:style>
+          <a:lnRef idx="1">
+            <a:schemeClr val="accent1"/>
+          </a:lnRef>
+          <a:fillRef idx="0">
+            <a:schemeClr val="accent1"/>
+          </a:fillRef>
+          <a:effectRef idx="0">
+            <a:schemeClr val="accent1"/>
+          </a:effectRef>
+          <a:fontRef idx="minor">
+            <a:schemeClr val="tx1"/>
+          </a:fontRef>
+        </p:style>
+      </p:cxnSp>
+      <p:sp>
+        <p:nvSpPr>
+          <p:cNvPr id="167" name="Rectangle 166">
+            <a:extLst>
+              <a:ext uri="{FF2B5EF4-FFF2-40B4-BE49-F238E27FC236}">
+                <a16:creationId xmlns:a16="http://schemas.microsoft.com/office/drawing/2014/main" id="{EFF19177-7C8E-4963-8A8A-21FCC9A46E4D}"/>
+              </a:ext>
+            </a:extLst>
+          </p:cNvPr>
+          <p:cNvSpPr/>
+          <p:nvPr/>
+        </p:nvSpPr>
+        <p:spPr>
+          <a:xfrm>
+            <a:off x="6996195" y="6262411"/>
+            <a:ext cx="839702" cy="184667"/>
+          </a:xfrm>
+          <a:prstGeom prst="rect">
+            <a:avLst/>
+          </a:prstGeom>
+          <a:solidFill>
+            <a:schemeClr val="bg1"/>
+          </a:solidFill>
+          <a:ln>
+            <a:solidFill>
+              <a:schemeClr val="tx1"/>
+            </a:solidFill>
+          </a:ln>
+        </p:spPr>
+        <p:style>
+          <a:lnRef idx="2">
+            <a:schemeClr val="accent1">
+              <a:shade val="50000"/>
+            </a:schemeClr>
+          </a:lnRef>
+          <a:fillRef idx="1">
+            <a:schemeClr val="accent1"/>
+          </a:fillRef>
+          <a:effectRef idx="0">
+            <a:schemeClr val="accent1"/>
+          </a:effectRef>
+          <a:fontRef idx="minor">
+            <a:schemeClr val="lt1"/>
+          </a:fontRef>
+        </p:style>
+        <p:txBody>
+          <a:bodyPr rtlCol="0" anchor="ctr"/>
+          <a:lstStyle/>
+          <a:p>
+            <a:pPr algn="ctr"/>
+            <a:endParaRPr lang="fr-FR"/>
+          </a:p>
+        </p:txBody>
+      </p:sp>
+      <p:sp>
+        <p:nvSpPr>
+          <p:cNvPr id="168" name="ZoneTexte 167">
+            <a:extLst>
+              <a:ext uri="{FF2B5EF4-FFF2-40B4-BE49-F238E27FC236}">
+                <a16:creationId xmlns:a16="http://schemas.microsoft.com/office/drawing/2014/main" id="{0420FDC0-B60C-41A8-BBA2-560EC65D049E}"/>
+              </a:ext>
+            </a:extLst>
+          </p:cNvPr>
+          <p:cNvSpPr txBox="1"/>
+          <p:nvPr/>
+        </p:nvSpPr>
+        <p:spPr>
+          <a:xfrm>
+            <a:off x="6991433" y="6269589"/>
+            <a:ext cx="839713" cy="184666"/>
+          </a:xfrm>
+          <a:prstGeom prst="rect">
+            <a:avLst/>
+          </a:prstGeom>
+          <a:noFill/>
+        </p:spPr>
+        <p:txBody>
+          <a:bodyPr wrap="square" rtlCol="0">
+            <a:spAutoFit/>
+          </a:bodyPr>
+          <a:lstStyle/>
+          <a:p>
+            <a:r>
+              <a:rPr lang="fr-FR" sz="600" dirty="0" err="1"/>
+              <a:t>UndefinedEnclosure</a:t>
+            </a:r>
+            <a:endParaRPr lang="fr-FR" sz="600" dirty="0"/>
+          </a:p>
+        </p:txBody>
+      </p:sp>
+      <p:sp>
+        <p:nvSpPr>
+          <p:cNvPr id="170" name="Rectangle 169">
+            <a:extLst>
+              <a:ext uri="{FF2B5EF4-FFF2-40B4-BE49-F238E27FC236}">
+                <a16:creationId xmlns:a16="http://schemas.microsoft.com/office/drawing/2014/main" id="{826E593B-F678-4028-A223-D9073C62FC92}"/>
+              </a:ext>
+            </a:extLst>
+          </p:cNvPr>
+          <p:cNvSpPr/>
+          <p:nvPr/>
+        </p:nvSpPr>
+        <p:spPr>
+          <a:xfrm>
+            <a:off x="6996181" y="6447202"/>
+            <a:ext cx="839713" cy="58030"/>
+          </a:xfrm>
+          <a:prstGeom prst="rect">
+            <a:avLst/>
+          </a:prstGeom>
+          <a:solidFill>
+            <a:schemeClr val="bg1"/>
+          </a:solidFill>
+          <a:ln>
+            <a:solidFill>
+              <a:schemeClr val="tx1"/>
+            </a:solidFill>
+          </a:ln>
+        </p:spPr>
+        <p:style>
+          <a:lnRef idx="2">
+            <a:schemeClr val="accent1">
+              <a:shade val="50000"/>
+            </a:schemeClr>
+          </a:lnRef>
+          <a:fillRef idx="1">
+            <a:schemeClr val="accent1"/>
+          </a:fillRef>
+          <a:effectRef idx="0">
+            <a:schemeClr val="accent1"/>
+          </a:effectRef>
+          <a:fontRef idx="minor">
+            <a:schemeClr val="lt1"/>
+          </a:fontRef>
+        </p:style>
+        <p:txBody>
+          <a:bodyPr rtlCol="0" anchor="ctr"/>
+          <a:lstStyle/>
+          <a:p>
+            <a:pPr algn="ctr"/>
+            <a:endParaRPr lang="fr-FR"/>
+          </a:p>
+        </p:txBody>
+      </p:sp>
+      <p:sp>
+        <p:nvSpPr>
+          <p:cNvPr id="171" name="Rectangle 170">
+            <a:extLst>
+              <a:ext uri="{FF2B5EF4-FFF2-40B4-BE49-F238E27FC236}">
+                <a16:creationId xmlns:a16="http://schemas.microsoft.com/office/drawing/2014/main" id="{39BF98A5-5DC4-405A-AC56-8A0D5F1B8E86}"/>
+              </a:ext>
+            </a:extLst>
+          </p:cNvPr>
+          <p:cNvSpPr/>
+          <p:nvPr/>
+        </p:nvSpPr>
+        <p:spPr>
+          <a:xfrm>
+            <a:off x="6996181" y="6502515"/>
+            <a:ext cx="839713" cy="58030"/>
+          </a:xfrm>
+          <a:prstGeom prst="rect">
+            <a:avLst/>
+          </a:prstGeom>
+          <a:solidFill>
+            <a:schemeClr val="bg1"/>
+          </a:solidFill>
+          <a:ln>
+            <a:solidFill>
+              <a:schemeClr val="tx1"/>
+            </a:solidFill>
+          </a:ln>
+        </p:spPr>
+        <p:style>
+          <a:lnRef idx="2">
+            <a:schemeClr val="accent1">
+              <a:shade val="50000"/>
+            </a:schemeClr>
+          </a:lnRef>
+          <a:fillRef idx="1">
+            <a:schemeClr val="accent1"/>
+          </a:fillRef>
+          <a:effectRef idx="0">
+            <a:schemeClr val="accent1"/>
+          </a:effectRef>
+          <a:fontRef idx="minor">
+            <a:schemeClr val="lt1"/>
+          </a:fontRef>
+        </p:style>
+        <p:txBody>
+          <a:bodyPr rtlCol="0" anchor="ctr"/>
+          <a:lstStyle/>
+          <a:p>
+            <a:pPr algn="ctr"/>
+            <a:endParaRPr lang="fr-FR"/>
           </a:p>
         </p:txBody>
       </p:sp>

</xml_diff>